<commit_message>
Uprava prezentace a vylepseni algoritmu a gui
</commit_message>
<xml_diff>
--- a/ZPO.App/Docs/zpo_prezentace.pptx
+++ b/ZPO.App/Docs/zpo_prezentace.pptx
@@ -106,6 +106,11 @@
       </a:defRPr>
     </a:lvl9pPr>
   </p:defaultTextStyle>
+  <p:extLst>
+    <p:ext uri="{EFAFB233-063F-42B5-8137-9DF3F51BA10A}">
+      <p15:sldGuideLst xmlns:p15="http://schemas.microsoft.com/office/powerpoint/2012/main"/>
+    </p:ext>
+  </p:extLst>
 </p:presentation>
 </file>
 
@@ -6101,7 +6106,6 @@
               <a:rPr lang="cs-CZ" dirty="0"/>
               <a:t>Identifikace barevné informace a barevných motivů v obraze</a:t>
             </a:r>
-            <a:endParaRPr lang="cs-CZ" dirty="0"/>
           </a:p>
         </p:txBody>
       </p:sp>
@@ -6117,23 +6121,25 @@
         </p:nvSpPr>
         <p:spPr/>
         <p:txBody>
-          <a:bodyPr/>
+          <a:bodyPr>
+            <a:noAutofit/>
+          </a:bodyPr>
           <a:lstStyle/>
           <a:p>
-            <a:endParaRPr lang="cs-CZ" dirty="0" smtClean="0"/>
-          </a:p>
-          <a:p>
-            <a:r>
-              <a:rPr lang="cs-CZ" dirty="0" smtClean="0"/>
+            <a:endParaRPr lang="cs-CZ" sz="2400" dirty="0" smtClean="0"/>
+          </a:p>
+          <a:p>
+            <a:r>
+              <a:rPr lang="cs-CZ" sz="2400" dirty="0" smtClean="0"/>
               <a:t>Bc. Adam Jež</a:t>
             </a:r>
           </a:p>
           <a:p>
             <a:r>
-              <a:rPr lang="cs-CZ" dirty="0" smtClean="0"/>
+              <a:rPr lang="cs-CZ" sz="2400" dirty="0" smtClean="0"/>
               <a:t>Bc. Radim Sváček </a:t>
             </a:r>
-            <a:endParaRPr lang="cs-CZ" dirty="0"/>
+            <a:endParaRPr lang="cs-CZ" sz="2400" dirty="0"/>
           </a:p>
         </p:txBody>
       </p:sp>
@@ -6207,35 +6213,37 @@
         </p:nvSpPr>
         <p:spPr>
           <a:xfrm>
-            <a:off x="1592375" y="198810"/>
+            <a:off x="1592375" y="282890"/>
             <a:ext cx="10018713" cy="3124201"/>
           </a:xfrm>
         </p:spPr>
         <p:txBody>
-          <a:bodyPr/>
+          <a:bodyPr>
+            <a:normAutofit/>
+          </a:bodyPr>
           <a:lstStyle/>
           <a:p>
             <a:r>
-              <a:rPr lang="cs-CZ" dirty="0" smtClean="0"/>
+              <a:rPr lang="cs-CZ" sz="2800" dirty="0" smtClean="0"/>
               <a:t>Aplikace na OS Windows</a:t>
             </a:r>
           </a:p>
           <a:p>
             <a:r>
-              <a:rPr lang="cs-CZ" dirty="0" smtClean="0"/>
+              <a:rPr lang="cs-CZ" sz="2800" dirty="0" smtClean="0"/>
               <a:t>Implementační jazyk: C#</a:t>
             </a:r>
           </a:p>
           <a:p>
             <a:r>
-              <a:rPr lang="cs-CZ" dirty="0" smtClean="0"/>
+              <a:rPr lang="cs-CZ" sz="2800" dirty="0" smtClean="0"/>
               <a:t>Použitý Framework: Universal Windows </a:t>
             </a:r>
             <a:r>
-              <a:rPr lang="cs-CZ" dirty="0" err="1" smtClean="0"/>
+              <a:rPr lang="cs-CZ" sz="2800" dirty="0" err="1" smtClean="0"/>
               <a:t>Platform</a:t>
             </a:r>
-            <a:endParaRPr lang="cs-CZ" dirty="0"/>
+            <a:endParaRPr lang="cs-CZ" sz="2800" dirty="0"/>
           </a:p>
         </p:txBody>
       </p:sp>
@@ -6249,7 +6257,7 @@
         </p:nvSpPr>
         <p:spPr>
           <a:xfrm>
-            <a:off x="1592374" y="3008514"/>
+            <a:off x="1592374" y="3418417"/>
             <a:ext cx="10018713" cy="3124201"/>
           </a:xfrm>
           <a:prstGeom prst="rect">
@@ -6489,24 +6497,24 @@
           </a:lstStyle>
           <a:p>
             <a:r>
-              <a:rPr lang="cs-CZ" dirty="0" smtClean="0"/>
+              <a:rPr lang="cs-CZ" sz="2800" dirty="0" smtClean="0"/>
               <a:t>Obrázky obsahující motivy s konstantní barvou</a:t>
             </a:r>
           </a:p>
           <a:p>
             <a:pPr lvl="1"/>
             <a:r>
-              <a:rPr lang="cs-CZ" dirty="0" smtClean="0"/>
+              <a:rPr lang="cs-CZ" sz="2400" dirty="0" smtClean="0"/>
               <a:t>písmo na flekatém/linkovaném podkladu</a:t>
             </a:r>
           </a:p>
           <a:p>
             <a:pPr lvl="1"/>
             <a:r>
-              <a:rPr lang="cs-CZ" dirty="0" smtClean="0"/>
+              <a:rPr lang="cs-CZ" sz="2400" dirty="0" smtClean="0"/>
               <a:t>vrstevnice v mapě</a:t>
             </a:r>
-            <a:endParaRPr lang="cs-CZ" dirty="0"/>
+            <a:endParaRPr lang="cs-CZ" sz="2400" dirty="0"/>
           </a:p>
         </p:txBody>
       </p:sp>
@@ -6627,6 +6635,13 @@
   <p:clrMapOvr>
     <a:masterClrMapping/>
   </p:clrMapOvr>
+  <p:timing>
+    <p:tnLst>
+      <p:par>
+        <p:cTn id="1" dur="indefinite" restart="never" nodeType="tmRoot"/>
+      </p:par>
+    </p:tnLst>
+  </p:timing>
 </p:sld>
 </file>
 
@@ -6687,53 +6702,55 @@
         </p:nvSpPr>
         <p:spPr>
           <a:xfrm>
-            <a:off x="1484310" y="663631"/>
+            <a:off x="1484310" y="716181"/>
             <a:ext cx="10018713" cy="3124201"/>
           </a:xfrm>
         </p:spPr>
         <p:txBody>
-          <a:bodyPr/>
+          <a:bodyPr>
+            <a:noAutofit/>
+          </a:bodyPr>
           <a:lstStyle/>
           <a:p>
             <a:r>
-              <a:rPr lang="cs-CZ" dirty="0" smtClean="0"/>
+              <a:rPr lang="cs-CZ" sz="2800" dirty="0" smtClean="0"/>
               <a:t>Adam </a:t>
             </a:r>
           </a:p>
           <a:p>
             <a:pPr lvl="1"/>
             <a:r>
-              <a:rPr lang="cs-CZ" dirty="0" smtClean="0"/>
+              <a:rPr lang="cs-CZ" sz="2400" dirty="0" smtClean="0"/>
               <a:t>Architektura aplikace</a:t>
             </a:r>
           </a:p>
           <a:p>
             <a:pPr lvl="1"/>
             <a:r>
-              <a:rPr lang="cs-CZ" dirty="0" smtClean="0"/>
+              <a:rPr lang="cs-CZ" sz="2400" dirty="0" smtClean="0"/>
               <a:t>Základní algoritmus</a:t>
             </a:r>
           </a:p>
           <a:p>
             <a:r>
-              <a:rPr lang="cs-CZ" dirty="0" smtClean="0"/>
+              <a:rPr lang="cs-CZ" sz="2800" dirty="0" smtClean="0"/>
               <a:t>Radim</a:t>
             </a:r>
           </a:p>
           <a:p>
             <a:pPr lvl="1"/>
             <a:r>
-              <a:rPr lang="cs-CZ" dirty="0" smtClean="0"/>
+              <a:rPr lang="cs-CZ" sz="2400" dirty="0" smtClean="0"/>
               <a:t>Pokročilé algoritmy</a:t>
             </a:r>
           </a:p>
           <a:p>
             <a:pPr lvl="1"/>
             <a:r>
-              <a:rPr lang="cs-CZ" dirty="0" smtClean="0"/>
+              <a:rPr lang="cs-CZ" sz="2400" dirty="0" smtClean="0"/>
               <a:t>Zpracování GUI</a:t>
             </a:r>
-            <a:endParaRPr lang="cs-CZ" dirty="0"/>
+            <a:endParaRPr lang="cs-CZ" sz="2400" dirty="0"/>
           </a:p>
         </p:txBody>
       </p:sp>
@@ -6854,7 +6871,7 @@
         </p:nvSpPr>
         <p:spPr>
           <a:xfrm>
-            <a:off x="1484310" y="3405452"/>
+            <a:off x="1484310" y="3615657"/>
             <a:ext cx="10018713" cy="3124201"/>
           </a:xfrm>
           <a:prstGeom prst="rect">
@@ -7094,19 +7111,66 @@
           </a:lstStyle>
           <a:p>
             <a:r>
-              <a:rPr lang="cs-CZ" dirty="0" smtClean="0"/>
+              <a:rPr lang="cs-CZ" sz="2800" dirty="0" smtClean="0"/>
               <a:t>Nastudované základní algoritmy</a:t>
             </a:r>
           </a:p>
           <a:p>
             <a:r>
-              <a:rPr lang="cs-CZ" dirty="0" smtClean="0"/>
+              <a:rPr lang="cs-CZ" sz="2800" dirty="0" smtClean="0"/>
               <a:t>Prototyp aplikace včetně jednoduchého GUI</a:t>
             </a:r>
-            <a:endParaRPr lang="cs-CZ" dirty="0"/>
-          </a:p>
-        </p:txBody>
-      </p:sp>
+            <a:endParaRPr lang="cs-CZ" sz="2800" dirty="0"/>
+          </a:p>
+        </p:txBody>
+      </p:sp>
+      <p:pic>
+        <p:nvPicPr>
+          <p:cNvPr id="6" name="Obrázek 5"/>
+          <p:cNvPicPr>
+            <a:picLocks noChangeAspect="1"/>
+          </p:cNvPicPr>
+          <p:nvPr/>
+        </p:nvPicPr>
+        <p:blipFill>
+          <a:blip r:embed="rId2"/>
+          <a:stretch>
+            <a:fillRect/>
+          </a:stretch>
+        </p:blipFill>
+        <p:spPr>
+          <a:xfrm>
+            <a:off x="7294449" y="1055207"/>
+            <a:ext cx="4208574" cy="2559948"/>
+          </a:xfrm>
+          <a:prstGeom prst="rect">
+            <a:avLst/>
+          </a:prstGeom>
+        </p:spPr>
+      </p:pic>
+      <p:pic>
+        <p:nvPicPr>
+          <p:cNvPr id="7" name="Obrázek 6"/>
+          <p:cNvPicPr>
+            <a:picLocks noChangeAspect="1"/>
+          </p:cNvPicPr>
+          <p:nvPr/>
+        </p:nvPicPr>
+        <p:blipFill rotWithShape="1">
+          <a:blip r:embed="rId3"/>
+          <a:srcRect l="-469" r="-1"/>
+          <a:stretch/>
+        </p:blipFill>
+        <p:spPr>
+          <a:xfrm>
+            <a:off x="8650014" y="4135109"/>
+            <a:ext cx="3660719" cy="2240346"/>
+          </a:xfrm>
+          <a:prstGeom prst="rect">
+            <a:avLst/>
+          </a:prstGeom>
+        </p:spPr>
+      </p:pic>
     </p:spTree>
     <p:extLst>
       <p:ext uri="{BB962C8B-B14F-4D97-AF65-F5344CB8AC3E}">
@@ -7117,6 +7181,13 @@
   <p:clrMapOvr>
     <a:masterClrMapping/>
   </p:clrMapOvr>
+  <p:timing>
+    <p:tnLst>
+      <p:par>
+        <p:cTn id="1" dur="indefinite" restart="never" nodeType="tmRoot"/>
+      </p:par>
+    </p:tnLst>
+  </p:timing>
 </p:sld>
 </file>
 

</xml_diff>